<commit_message>
member information update ~ing
</commit_message>
<xml_diff>
--- a/동욱) 관리자/관리자 페이지 관계도.pptx
+++ b/동욱) 관리자/관리자 페이지 관계도.pptx
@@ -104,7 +104,41 @@
       </a:defRPr>
     </a:lvl9pPr>
   </p:defaultTextStyle>
+  <p:extLst>
+    <p:ext uri="{EFAFB233-063F-42B5-8137-9DF3F51BA10A}">
+      <p15:sldGuideLst xmlns:p15="http://schemas.microsoft.com/office/powerpoint/2012/main"/>
+    </p:ext>
+  </p:extLst>
 </p:presentation>
+</file>
+
+<file path=ppt/changesInfos/changesInfo1.xml><?xml version="1.0" encoding="utf-8"?>
+<pc:chgInfo xmlns:a="http://schemas.openxmlformats.org/drawingml/2006/main" xmlns:r="http://schemas.openxmlformats.org/officeDocument/2006/relationships" xmlns:ac="http://schemas.microsoft.com/office/drawing/2013/main/command" xmlns:pc="http://schemas.microsoft.com/office/powerpoint/2013/main/command">
+  <pc:docChgLst>
+    <pc:chgData name="최 정은" userId="f8f6106097c1ee4d" providerId="LiveId" clId="{C98F5A3B-E31B-4260-92A2-19D6529BB406}"/>
+    <pc:docChg chg="modSld">
+      <pc:chgData name="최 정은" userId="f8f6106097c1ee4d" providerId="LiveId" clId="{C98F5A3B-E31B-4260-92A2-19D6529BB406}" dt="2021-08-05T01:21:24.406" v="0" actId="20577"/>
+      <pc:docMkLst>
+        <pc:docMk/>
+      </pc:docMkLst>
+      <pc:sldChg chg="modSp mod">
+        <pc:chgData name="최 정은" userId="f8f6106097c1ee4d" providerId="LiveId" clId="{C98F5A3B-E31B-4260-92A2-19D6529BB406}" dt="2021-08-05T01:21:24.406" v="0" actId="20577"/>
+        <pc:sldMkLst>
+          <pc:docMk/>
+          <pc:sldMk cId="4108842298" sldId="256"/>
+        </pc:sldMkLst>
+        <pc:spChg chg="mod">
+          <ac:chgData name="최 정은" userId="f8f6106097c1ee4d" providerId="LiveId" clId="{C98F5A3B-E31B-4260-92A2-19D6529BB406}" dt="2021-08-05T01:21:24.406" v="0" actId="20577"/>
+          <ac:spMkLst>
+            <pc:docMk/>
+            <pc:sldMk cId="4108842298" sldId="256"/>
+            <ac:spMk id="7" creationId="{C7892C39-28B9-494A-8174-911908EBBF2D}"/>
+          </ac:spMkLst>
+        </pc:spChg>
+      </pc:sldChg>
+    </pc:docChg>
+  </pc:docChgLst>
+</pc:chgInfo>
 </file>
 
 <file path=ppt/slideLayouts/slideLayout1.xml><?xml version="1.0" encoding="utf-8"?>
@@ -254,7 +288,7 @@
           <a:p>
             <a:fld id="{37141FBB-7BBA-4E7F-B97D-B06042AA3934}" type="datetimeFigureOut">
               <a:rPr lang="ko-KR" altLang="en-US" smtClean="0"/>
-              <a:t>2021-07-30</a:t>
+              <a:t>2021-08-05</a:t>
             </a:fld>
             <a:endParaRPr lang="ko-KR" altLang="en-US"/>
           </a:p>
@@ -452,7 +486,7 @@
           <a:p>
             <a:fld id="{37141FBB-7BBA-4E7F-B97D-B06042AA3934}" type="datetimeFigureOut">
               <a:rPr lang="ko-KR" altLang="en-US" smtClean="0"/>
-              <a:t>2021-07-30</a:t>
+              <a:t>2021-08-05</a:t>
             </a:fld>
             <a:endParaRPr lang="ko-KR" altLang="en-US"/>
           </a:p>
@@ -660,7 +694,7 @@
           <a:p>
             <a:fld id="{37141FBB-7BBA-4E7F-B97D-B06042AA3934}" type="datetimeFigureOut">
               <a:rPr lang="ko-KR" altLang="en-US" smtClean="0"/>
-              <a:t>2021-07-30</a:t>
+              <a:t>2021-08-05</a:t>
             </a:fld>
             <a:endParaRPr lang="ko-KR" altLang="en-US"/>
           </a:p>
@@ -858,7 +892,7 @@
           <a:p>
             <a:fld id="{37141FBB-7BBA-4E7F-B97D-B06042AA3934}" type="datetimeFigureOut">
               <a:rPr lang="ko-KR" altLang="en-US" smtClean="0"/>
-              <a:t>2021-07-30</a:t>
+              <a:t>2021-08-05</a:t>
             </a:fld>
             <a:endParaRPr lang="ko-KR" altLang="en-US"/>
           </a:p>
@@ -1133,7 +1167,7 @@
           <a:p>
             <a:fld id="{37141FBB-7BBA-4E7F-B97D-B06042AA3934}" type="datetimeFigureOut">
               <a:rPr lang="ko-KR" altLang="en-US" smtClean="0"/>
-              <a:t>2021-07-30</a:t>
+              <a:t>2021-08-05</a:t>
             </a:fld>
             <a:endParaRPr lang="ko-KR" altLang="en-US"/>
           </a:p>
@@ -1398,7 +1432,7 @@
           <a:p>
             <a:fld id="{37141FBB-7BBA-4E7F-B97D-B06042AA3934}" type="datetimeFigureOut">
               <a:rPr lang="ko-KR" altLang="en-US" smtClean="0"/>
-              <a:t>2021-07-30</a:t>
+              <a:t>2021-08-05</a:t>
             </a:fld>
             <a:endParaRPr lang="ko-KR" altLang="en-US"/>
           </a:p>
@@ -1810,7 +1844,7 @@
           <a:p>
             <a:fld id="{37141FBB-7BBA-4E7F-B97D-B06042AA3934}" type="datetimeFigureOut">
               <a:rPr lang="ko-KR" altLang="en-US" smtClean="0"/>
-              <a:t>2021-07-30</a:t>
+              <a:t>2021-08-05</a:t>
             </a:fld>
             <a:endParaRPr lang="ko-KR" altLang="en-US"/>
           </a:p>
@@ -1951,7 +1985,7 @@
           <a:p>
             <a:fld id="{37141FBB-7BBA-4E7F-B97D-B06042AA3934}" type="datetimeFigureOut">
               <a:rPr lang="ko-KR" altLang="en-US" smtClean="0"/>
-              <a:t>2021-07-30</a:t>
+              <a:t>2021-08-05</a:t>
             </a:fld>
             <a:endParaRPr lang="ko-KR" altLang="en-US"/>
           </a:p>
@@ -2064,7 +2098,7 @@
           <a:p>
             <a:fld id="{37141FBB-7BBA-4E7F-B97D-B06042AA3934}" type="datetimeFigureOut">
               <a:rPr lang="ko-KR" altLang="en-US" smtClean="0"/>
-              <a:t>2021-07-30</a:t>
+              <a:t>2021-08-05</a:t>
             </a:fld>
             <a:endParaRPr lang="ko-KR" altLang="en-US"/>
           </a:p>
@@ -2375,7 +2409,7 @@
           <a:p>
             <a:fld id="{37141FBB-7BBA-4E7F-B97D-B06042AA3934}" type="datetimeFigureOut">
               <a:rPr lang="ko-KR" altLang="en-US" smtClean="0"/>
-              <a:t>2021-07-30</a:t>
+              <a:t>2021-08-05</a:t>
             </a:fld>
             <a:endParaRPr lang="ko-KR" altLang="en-US"/>
           </a:p>
@@ -2663,7 +2697,7 @@
           <a:p>
             <a:fld id="{37141FBB-7BBA-4E7F-B97D-B06042AA3934}" type="datetimeFigureOut">
               <a:rPr lang="ko-KR" altLang="en-US" smtClean="0"/>
-              <a:t>2021-07-30</a:t>
+              <a:t>2021-08-05</a:t>
             </a:fld>
             <a:endParaRPr lang="ko-KR" altLang="en-US"/>
           </a:p>
@@ -2904,7 +2938,7 @@
           <a:p>
             <a:fld id="{37141FBB-7BBA-4E7F-B97D-B06042AA3934}" type="datetimeFigureOut">
               <a:rPr lang="ko-KR" altLang="en-US" smtClean="0"/>
-              <a:t>2021-07-30</a:t>
+              <a:t>2021-08-05</a:t>
             </a:fld>
             <a:endParaRPr lang="ko-KR" altLang="en-US"/>
           </a:p>
@@ -3524,7 +3558,19 @@
             <a:pPr algn="ctr"/>
             <a:r>
               <a:rPr lang="ko-KR" altLang="en-US" dirty="0"/>
-              <a:t>기존 비밀번호 확인</a:t>
+              <a:t>기존 비밀</a:t>
+            </a:r>
+            <a:endParaRPr lang="en-US" altLang="ko-KR"/>
+          </a:p>
+          <a:p>
+            <a:pPr algn="ctr"/>
+            <a:r>
+              <a:rPr lang="ko-KR" altLang="en-US"/>
+              <a:t>번호 </a:t>
+            </a:r>
+            <a:r>
+              <a:rPr lang="ko-KR" altLang="en-US" dirty="0"/>
+              <a:t>확인</a:t>
             </a:r>
             <a:r>
               <a:rPr lang="en-US" altLang="ko-KR" dirty="0"/>

</xml_diff>